<commit_message>
small update to slides + HW2 sols
</commit_message>
<xml_diff>
--- a/week3/Day2 - causality_and_experiments - Brian.pptx
+++ b/week3/Day2 - causality_and_experiments - Brian.pptx
@@ -4475,8 +4475,8 @@
           </a:p>
         </p:txBody>
       </p:sp>
-      <mc:AlternateContent xmlns:mc="http://schemas.openxmlformats.org/markup-compatibility/2006">
-        <mc:Choice xmlns:a14="http://schemas.microsoft.com/office/drawing/2010/main" Requires="a14">
+      <mc:AlternateContent xmlns:mc="http://schemas.openxmlformats.org/markup-compatibility/2006" xmlns:a14="http://schemas.microsoft.com/office/drawing/2010/main">
+        <mc:Choice Requires="a14">
           <p:sp>
             <p:nvSpPr>
               <p:cNvPr id="3" name="Content Placeholder 2"/>
@@ -4558,7 +4558,7 @@
             </p:txBody>
           </p:sp>
         </mc:Choice>
-        <mc:Fallback>
+        <mc:Fallback xmlns="">
           <p:sp>
             <p:nvSpPr>
               <p:cNvPr id="3" name="Content Placeholder 2"/>
@@ -15444,9 +15444,10 @@
           <a:lstStyle/>
           <a:p>
             <a:r>
-              <a:rPr lang="en-US" dirty="0"/>
-              <a:t>Cohen’s d</a:t>
-            </a:r>
+              <a:rPr lang="en-US"/>
+              <a:t>Visualizations</a:t>
+            </a:r>
+            <a:endParaRPr lang="en-US" dirty="0"/>
           </a:p>
         </p:txBody>
       </p:sp>
@@ -15466,11 +15467,31 @@
           <a:lstStyle/>
           <a:p>
             <a:r>
+              <a:rPr lang="en-US" dirty="0"/>
+              <a:t>Cohen’s d: </a:t>
+            </a:r>
+            <a:r>
               <a:rPr lang="en-US" dirty="0">
                 <a:hlinkClick r:id="rId2"/>
               </a:rPr>
               <a:t>http://rpsychologist.com/d3/cohend/</a:t>
             </a:r>
+            <a:endParaRPr lang="en-US" dirty="0"/>
+          </a:p>
+          <a:p>
+            <a:r>
+              <a:rPr lang="en-US" dirty="0"/>
+              <a:t>Power &amp; Statistical Significance: </a:t>
+            </a:r>
+            <a:r>
+              <a:rPr lang="en-US" dirty="0">
+                <a:hlinkClick r:id="rId3"/>
+              </a:rPr>
+              <a:t>http://rpsychologist.com/d3/NHST/</a:t>
+            </a:r>
+            <a:endParaRPr lang="en-US" dirty="0"/>
+          </a:p>
+          <a:p>
             <a:endParaRPr lang="en-US" dirty="0"/>
           </a:p>
           <a:p>
@@ -18643,8 +18664,8 @@
           </a:p>
         </p:txBody>
       </p:sp>
-      <mc:AlternateContent xmlns:mc="http://schemas.openxmlformats.org/markup-compatibility/2006">
-        <mc:Choice xmlns:a14="http://schemas.microsoft.com/office/drawing/2010/main" Requires="a14">
+      <mc:AlternateContent xmlns:mc="http://schemas.openxmlformats.org/markup-compatibility/2006" xmlns:a14="http://schemas.microsoft.com/office/drawing/2010/main">
+        <mc:Choice Requires="a14">
           <p:sp>
             <p:nvSpPr>
               <p:cNvPr id="3" name="Content Placeholder 2"/>
@@ -18862,7 +18883,7 @@
             </p:txBody>
           </p:sp>
         </mc:Choice>
-        <mc:Fallback>
+        <mc:Fallback xmlns="">
           <p:sp>
             <p:nvSpPr>
               <p:cNvPr id="3" name="Content Placeholder 2"/>
@@ -19224,8 +19245,8 @@
           </a:p>
         </p:txBody>
       </p:sp>
-      <mc:AlternateContent xmlns:mc="http://schemas.openxmlformats.org/markup-compatibility/2006">
-        <mc:Choice xmlns:a14="http://schemas.microsoft.com/office/drawing/2010/main" Requires="a14">
+      <mc:AlternateContent xmlns:mc="http://schemas.openxmlformats.org/markup-compatibility/2006" xmlns:a14="http://schemas.microsoft.com/office/drawing/2010/main">
+        <mc:Choice Requires="a14">
           <p:sp>
             <p:nvSpPr>
               <p:cNvPr id="3" name="Content Placeholder 2"/>
@@ -19476,7 +19497,7 @@
             </p:txBody>
           </p:sp>
         </mc:Choice>
-        <mc:Fallback>
+        <mc:Fallback xmlns="">
           <p:sp>
             <p:nvSpPr>
               <p:cNvPr id="3" name="Content Placeholder 2"/>

</xml_diff>